<commit_message>
Some changes in the ppts, in the code
</commit_message>
<xml_diff>
--- a/Notes/Bias_Variance_Trade_Off.pptx
+++ b/Notes/Bias_Variance_Trade_Off.pptx
@@ -5,7 +5,7 @@
     <p:sldMasterId id="2147483648" r:id="rId1"/>
   </p:sldMasterIdLst>
   <p:notesMasterIdLst>
-    <p:notesMasterId r:id="rId11"/>
+    <p:notesMasterId r:id="rId14"/>
   </p:notesMasterIdLst>
   <p:sldIdLst>
     <p:sldId id="275" r:id="rId2"/>
@@ -17,6 +17,9 @@
     <p:sldId id="314" r:id="rId8"/>
     <p:sldId id="322" r:id="rId9"/>
     <p:sldId id="316" r:id="rId10"/>
+    <p:sldId id="307" r:id="rId11"/>
+    <p:sldId id="308" r:id="rId12"/>
+    <p:sldId id="310" r:id="rId13"/>
   </p:sldIdLst>
   <p:sldSz cx="12192000" cy="6858000"/>
   <p:notesSz cx="6858000" cy="9144000"/>
@@ -5906,6 +5909,1441 @@
     <p:extLst>
       <p:ext uri="{BB962C8B-B14F-4D97-AF65-F5344CB8AC3E}">
         <p14:creationId xmlns:p14="http://schemas.microsoft.com/office/powerpoint/2010/main" val="773796027"/>
+      </p:ext>
+    </p:extLst>
+  </p:cSld>
+  <p:clrMapOvr>
+    <a:masterClrMapping/>
+  </p:clrMapOvr>
+</p:sld>
+</file>
+
+<file path=ppt/slides/slide10.xml><?xml version="1.0" encoding="utf-8"?>
+<p:sld xmlns:a="http://schemas.openxmlformats.org/drawingml/2006/main" xmlns:r="http://schemas.openxmlformats.org/officeDocument/2006/relationships" xmlns:p="http://schemas.openxmlformats.org/presentationml/2006/main" show="0">
+  <p:cSld>
+    <p:spTree>
+      <p:nvGrpSpPr>
+        <p:cNvPr id="1" name=""/>
+        <p:cNvGrpSpPr/>
+        <p:nvPr/>
+      </p:nvGrpSpPr>
+      <p:grpSpPr>
+        <a:xfrm>
+          <a:off x="0" y="0"/>
+          <a:ext cx="0" cy="0"/>
+          <a:chOff x="0" y="0"/>
+          <a:chExt cx="0" cy="0"/>
+        </a:xfrm>
+      </p:grpSpPr>
+      <p:sp>
+        <p:nvSpPr>
+          <p:cNvPr id="2" name="Title 1">
+            <a:extLst>
+              <a:ext uri="{FF2B5EF4-FFF2-40B4-BE49-F238E27FC236}">
+                <a16:creationId xmlns:a16="http://schemas.microsoft.com/office/drawing/2014/main" id="{BE60887C-06BA-84A0-C69F-35AEA5716E12}"/>
+              </a:ext>
+            </a:extLst>
+          </p:cNvPr>
+          <p:cNvSpPr>
+            <a:spLocks noGrp="1"/>
+          </p:cNvSpPr>
+          <p:nvPr>
+            <p:ph type="title"/>
+          </p:nvPr>
+        </p:nvSpPr>
+        <p:spPr/>
+        <p:txBody>
+          <a:bodyPr/>
+          <a:lstStyle/>
+          <a:p>
+            <a:r>
+              <a:rPr lang="en-AU" dirty="0"/>
+              <a:t>Bias </a:t>
+            </a:r>
+          </a:p>
+        </p:txBody>
+      </p:sp>
+      <p:sp>
+        <p:nvSpPr>
+          <p:cNvPr id="3" name="Content Placeholder 2">
+            <a:extLst>
+              <a:ext uri="{FF2B5EF4-FFF2-40B4-BE49-F238E27FC236}">
+                <a16:creationId xmlns:a16="http://schemas.microsoft.com/office/drawing/2014/main" id="{B481F1D1-6070-4D59-5F41-DE56A4972550}"/>
+              </a:ext>
+            </a:extLst>
+          </p:cNvPr>
+          <p:cNvSpPr>
+            <a:spLocks noGrp="1"/>
+          </p:cNvSpPr>
+          <p:nvPr>
+            <p:ph sz="half" idx="1"/>
+          </p:nvPr>
+        </p:nvSpPr>
+        <p:spPr/>
+        <p:txBody>
+          <a:bodyPr>
+            <a:normAutofit/>
+          </a:bodyPr>
+          <a:lstStyle/>
+          <a:p>
+            <a:r>
+              <a:rPr lang="en-AU" dirty="0"/>
+              <a:t>Bias error = 1 – Accuracy of a random forest</a:t>
+            </a:r>
+          </a:p>
+        </p:txBody>
+      </p:sp>
+      <mc:AlternateContent xmlns:mc="http://schemas.openxmlformats.org/markup-compatibility/2006" xmlns:a14="http://schemas.microsoft.com/office/drawing/2010/main">
+        <mc:Choice Requires="a14">
+          <p:sp>
+            <p:nvSpPr>
+              <p:cNvPr id="25" name="Content Placeholder 2">
+                <a:extLst>
+                  <a:ext uri="{FF2B5EF4-FFF2-40B4-BE49-F238E27FC236}">
+                    <a16:creationId xmlns:a16="http://schemas.microsoft.com/office/drawing/2014/main" id="{B78EE824-AF7B-C85F-18D4-24BCC4A5273C}"/>
+                  </a:ext>
+                </a:extLst>
+              </p:cNvPr>
+              <p:cNvSpPr txBox="1">
+                <a:spLocks/>
+              </p:cNvSpPr>
+              <p:nvPr/>
+            </p:nvSpPr>
+            <p:spPr>
+              <a:xfrm>
+                <a:off x="5823857" y="1825625"/>
+                <a:ext cx="5181600" cy="4351338"/>
+              </a:xfrm>
+              <a:prstGeom prst="rect">
+                <a:avLst/>
+              </a:prstGeom>
+            </p:spPr>
+            <p:txBody>
+              <a:bodyPr vert="horz" lIns="91440" tIns="45720" rIns="91440" bIns="45720" rtlCol="0">
+                <a:normAutofit/>
+              </a:bodyPr>
+              <a:lstStyle>
+                <a:lvl1pPr marL="228600" indent="-228600" algn="l" defTabSz="914400" rtl="0" eaLnBrk="1" latinLnBrk="0" hangingPunct="1">
+                  <a:lnSpc>
+                    <a:spcPct val="90000"/>
+                  </a:lnSpc>
+                  <a:spcBef>
+                    <a:spcPts val="1000"/>
+                  </a:spcBef>
+                  <a:buFont typeface="Arial" panose="020B0604020202020204" pitchFamily="34" charset="0"/>
+                  <a:buChar char="•"/>
+                  <a:defRPr sz="2800" kern="1200">
+                    <a:solidFill>
+                      <a:schemeClr val="tx1"/>
+                    </a:solidFill>
+                    <a:latin typeface="+mn-lt"/>
+                    <a:ea typeface="+mn-ea"/>
+                    <a:cs typeface="+mn-cs"/>
+                  </a:defRPr>
+                </a:lvl1pPr>
+                <a:lvl2pPr marL="685800" indent="-228600" algn="l" defTabSz="914400" rtl="0" eaLnBrk="1" latinLnBrk="0" hangingPunct="1">
+                  <a:lnSpc>
+                    <a:spcPct val="90000"/>
+                  </a:lnSpc>
+                  <a:spcBef>
+                    <a:spcPts val="500"/>
+                  </a:spcBef>
+                  <a:buFont typeface="Arial" panose="020B0604020202020204" pitchFamily="34" charset="0"/>
+                  <a:buChar char="•"/>
+                  <a:defRPr sz="2400" kern="1200">
+                    <a:solidFill>
+                      <a:schemeClr val="tx1"/>
+                    </a:solidFill>
+                    <a:latin typeface="+mn-lt"/>
+                    <a:ea typeface="+mn-ea"/>
+                    <a:cs typeface="+mn-cs"/>
+                  </a:defRPr>
+                </a:lvl2pPr>
+                <a:lvl3pPr marL="1143000" indent="-228600" algn="l" defTabSz="914400" rtl="0" eaLnBrk="1" latinLnBrk="0" hangingPunct="1">
+                  <a:lnSpc>
+                    <a:spcPct val="90000"/>
+                  </a:lnSpc>
+                  <a:spcBef>
+                    <a:spcPts val="500"/>
+                  </a:spcBef>
+                  <a:buFont typeface="Arial" panose="020B0604020202020204" pitchFamily="34" charset="0"/>
+                  <a:buChar char="•"/>
+                  <a:defRPr sz="2000" kern="1200">
+                    <a:solidFill>
+                      <a:schemeClr val="tx1"/>
+                    </a:solidFill>
+                    <a:latin typeface="+mn-lt"/>
+                    <a:ea typeface="+mn-ea"/>
+                    <a:cs typeface="+mn-cs"/>
+                  </a:defRPr>
+                </a:lvl3pPr>
+                <a:lvl4pPr marL="1600200" indent="-228600" algn="l" defTabSz="914400" rtl="0" eaLnBrk="1" latinLnBrk="0" hangingPunct="1">
+                  <a:lnSpc>
+                    <a:spcPct val="90000"/>
+                  </a:lnSpc>
+                  <a:spcBef>
+                    <a:spcPts val="500"/>
+                  </a:spcBef>
+                  <a:buFont typeface="Arial" panose="020B0604020202020204" pitchFamily="34" charset="0"/>
+                  <a:buChar char="•"/>
+                  <a:defRPr sz="1800" kern="1200">
+                    <a:solidFill>
+                      <a:schemeClr val="tx1"/>
+                    </a:solidFill>
+                    <a:latin typeface="+mn-lt"/>
+                    <a:ea typeface="+mn-ea"/>
+                    <a:cs typeface="+mn-cs"/>
+                  </a:defRPr>
+                </a:lvl4pPr>
+                <a:lvl5pPr marL="2057400" indent="-228600" algn="l" defTabSz="914400" rtl="0" eaLnBrk="1" latinLnBrk="0" hangingPunct="1">
+                  <a:lnSpc>
+                    <a:spcPct val="90000"/>
+                  </a:lnSpc>
+                  <a:spcBef>
+                    <a:spcPts val="500"/>
+                  </a:spcBef>
+                  <a:buFont typeface="Arial" panose="020B0604020202020204" pitchFamily="34" charset="0"/>
+                  <a:buChar char="•"/>
+                  <a:defRPr sz="1800" kern="1200">
+                    <a:solidFill>
+                      <a:schemeClr val="tx1"/>
+                    </a:solidFill>
+                    <a:latin typeface="+mn-lt"/>
+                    <a:ea typeface="+mn-ea"/>
+                    <a:cs typeface="+mn-cs"/>
+                  </a:defRPr>
+                </a:lvl5pPr>
+                <a:lvl6pPr marL="2514600" indent="-228600" algn="l" defTabSz="914400" rtl="0" eaLnBrk="1" latinLnBrk="0" hangingPunct="1">
+                  <a:lnSpc>
+                    <a:spcPct val="90000"/>
+                  </a:lnSpc>
+                  <a:spcBef>
+                    <a:spcPts val="500"/>
+                  </a:spcBef>
+                  <a:buFont typeface="Arial" panose="020B0604020202020204" pitchFamily="34" charset="0"/>
+                  <a:buChar char="•"/>
+                  <a:defRPr sz="1800" kern="1200">
+                    <a:solidFill>
+                      <a:schemeClr val="tx1"/>
+                    </a:solidFill>
+                    <a:latin typeface="+mn-lt"/>
+                    <a:ea typeface="+mn-ea"/>
+                    <a:cs typeface="+mn-cs"/>
+                  </a:defRPr>
+                </a:lvl6pPr>
+                <a:lvl7pPr marL="2971800" indent="-228600" algn="l" defTabSz="914400" rtl="0" eaLnBrk="1" latinLnBrk="0" hangingPunct="1">
+                  <a:lnSpc>
+                    <a:spcPct val="90000"/>
+                  </a:lnSpc>
+                  <a:spcBef>
+                    <a:spcPts val="500"/>
+                  </a:spcBef>
+                  <a:buFont typeface="Arial" panose="020B0604020202020204" pitchFamily="34" charset="0"/>
+                  <a:buChar char="•"/>
+                  <a:defRPr sz="1800" kern="1200">
+                    <a:solidFill>
+                      <a:schemeClr val="tx1"/>
+                    </a:solidFill>
+                    <a:latin typeface="+mn-lt"/>
+                    <a:ea typeface="+mn-ea"/>
+                    <a:cs typeface="+mn-cs"/>
+                  </a:defRPr>
+                </a:lvl7pPr>
+                <a:lvl8pPr marL="3429000" indent="-228600" algn="l" defTabSz="914400" rtl="0" eaLnBrk="1" latinLnBrk="0" hangingPunct="1">
+                  <a:lnSpc>
+                    <a:spcPct val="90000"/>
+                  </a:lnSpc>
+                  <a:spcBef>
+                    <a:spcPts val="500"/>
+                  </a:spcBef>
+                  <a:buFont typeface="Arial" panose="020B0604020202020204" pitchFamily="34" charset="0"/>
+                  <a:buChar char="•"/>
+                  <a:defRPr sz="1800" kern="1200">
+                    <a:solidFill>
+                      <a:schemeClr val="tx1"/>
+                    </a:solidFill>
+                    <a:latin typeface="+mn-lt"/>
+                    <a:ea typeface="+mn-ea"/>
+                    <a:cs typeface="+mn-cs"/>
+                  </a:defRPr>
+                </a:lvl8pPr>
+                <a:lvl9pPr marL="3886200" indent="-228600" algn="l" defTabSz="914400" rtl="0" eaLnBrk="1" latinLnBrk="0" hangingPunct="1">
+                  <a:lnSpc>
+                    <a:spcPct val="90000"/>
+                  </a:lnSpc>
+                  <a:spcBef>
+                    <a:spcPts val="500"/>
+                  </a:spcBef>
+                  <a:buFont typeface="Arial" panose="020B0604020202020204" pitchFamily="34" charset="0"/>
+                  <a:buChar char="•"/>
+                  <a:defRPr sz="1800" kern="1200">
+                    <a:solidFill>
+                      <a:schemeClr val="tx1"/>
+                    </a:solidFill>
+                    <a:latin typeface="+mn-lt"/>
+                    <a:ea typeface="+mn-ea"/>
+                    <a:cs typeface="+mn-cs"/>
+                  </a:defRPr>
+                </a:lvl9pPr>
+              </a:lstStyle>
+              <a:p>
+                <a:r>
+                  <a:rPr lang="en-AU" dirty="0"/>
+                  <a:t>We have a training data set consist of points </a:t>
+                </a:r>
+                <a14:m>
+                  <m:oMath xmlns:m="http://schemas.openxmlformats.org/officeDocument/2006/math">
+                    <m:sSub>
+                      <m:sSubPr>
+                        <m:ctrlPr>
+                          <a:rPr lang="en-AU" b="0" i="1" smtClean="0">
+                            <a:latin typeface="Cambria Math" panose="02040503050406030204" pitchFamily="18" charset="0"/>
+                          </a:rPr>
+                        </m:ctrlPr>
+                      </m:sSubPr>
+                      <m:e>
+                        <m:r>
+                          <a:rPr lang="en-AU" b="0" i="1" smtClean="0">
+                            <a:latin typeface="Cambria Math" panose="02040503050406030204" pitchFamily="18" charset="0"/>
+                          </a:rPr>
+                          <m:t>𝑥</m:t>
+                        </m:r>
+                      </m:e>
+                      <m:sub>
+                        <m:r>
+                          <a:rPr lang="en-AU" b="0" i="1" smtClean="0">
+                            <a:latin typeface="Cambria Math" panose="02040503050406030204" pitchFamily="18" charset="0"/>
+                          </a:rPr>
+                          <m:t>1</m:t>
+                        </m:r>
+                      </m:sub>
+                    </m:sSub>
+                    <m:r>
+                      <a:rPr lang="en-AU" b="0" i="1" smtClean="0">
+                        <a:latin typeface="Cambria Math" panose="02040503050406030204" pitchFamily="18" charset="0"/>
+                      </a:rPr>
+                      <m:t>,</m:t>
+                    </m:r>
+                    <m:sSub>
+                      <m:sSubPr>
+                        <m:ctrlPr>
+                          <a:rPr lang="en-AU" b="0" i="1" smtClean="0">
+                            <a:latin typeface="Cambria Math" panose="02040503050406030204" pitchFamily="18" charset="0"/>
+                          </a:rPr>
+                        </m:ctrlPr>
+                      </m:sSubPr>
+                      <m:e>
+                        <m:r>
+                          <a:rPr lang="en-AU" b="0" i="1" smtClean="0">
+                            <a:latin typeface="Cambria Math" panose="02040503050406030204" pitchFamily="18" charset="0"/>
+                          </a:rPr>
+                          <m:t>𝑥</m:t>
+                        </m:r>
+                      </m:e>
+                      <m:sub>
+                        <m:r>
+                          <a:rPr lang="en-AU" b="0" i="1" smtClean="0">
+                            <a:latin typeface="Cambria Math" panose="02040503050406030204" pitchFamily="18" charset="0"/>
+                          </a:rPr>
+                          <m:t>2</m:t>
+                        </m:r>
+                      </m:sub>
+                    </m:sSub>
+                    <m:r>
+                      <a:rPr lang="en-AU" b="0" i="1" smtClean="0">
+                        <a:latin typeface="Cambria Math" panose="02040503050406030204" pitchFamily="18" charset="0"/>
+                      </a:rPr>
+                      <m:t>,</m:t>
+                    </m:r>
+                    <m:sSub>
+                      <m:sSubPr>
+                        <m:ctrlPr>
+                          <a:rPr lang="en-AU" b="0" i="1" smtClean="0">
+                            <a:latin typeface="Cambria Math" panose="02040503050406030204" pitchFamily="18" charset="0"/>
+                          </a:rPr>
+                        </m:ctrlPr>
+                      </m:sSubPr>
+                      <m:e>
+                        <m:r>
+                          <a:rPr lang="en-AU" b="0" i="1" smtClean="0">
+                            <a:latin typeface="Cambria Math" panose="02040503050406030204" pitchFamily="18" charset="0"/>
+                          </a:rPr>
+                          <m:t>𝑥</m:t>
+                        </m:r>
+                      </m:e>
+                      <m:sub>
+                        <m:r>
+                          <a:rPr lang="en-AU" b="0" i="1" smtClean="0">
+                            <a:latin typeface="Cambria Math" panose="02040503050406030204" pitchFamily="18" charset="0"/>
+                          </a:rPr>
+                          <m:t>3</m:t>
+                        </m:r>
+                      </m:sub>
+                    </m:sSub>
+                    <m:r>
+                      <a:rPr lang="en-AU" b="0" i="1" smtClean="0">
+                        <a:latin typeface="Cambria Math" panose="02040503050406030204" pitchFamily="18" charset="0"/>
+                      </a:rPr>
+                      <m:t>,…</m:t>
+                    </m:r>
+                    <m:sSub>
+                      <m:sSubPr>
+                        <m:ctrlPr>
+                          <a:rPr lang="en-AU" b="0" i="1" smtClean="0">
+                            <a:latin typeface="Cambria Math" panose="02040503050406030204" pitchFamily="18" charset="0"/>
+                          </a:rPr>
+                        </m:ctrlPr>
+                      </m:sSubPr>
+                      <m:e>
+                        <m:r>
+                          <a:rPr lang="en-AU" b="0" i="1" smtClean="0">
+                            <a:latin typeface="Cambria Math" panose="02040503050406030204" pitchFamily="18" charset="0"/>
+                          </a:rPr>
+                          <m:t>𝑥</m:t>
+                        </m:r>
+                      </m:e>
+                      <m:sub>
+                        <m:r>
+                          <a:rPr lang="en-AU" b="0" i="1" smtClean="0">
+                            <a:latin typeface="Cambria Math" panose="02040503050406030204" pitchFamily="18" charset="0"/>
+                          </a:rPr>
+                          <m:t>𝑛</m:t>
+                        </m:r>
+                      </m:sub>
+                    </m:sSub>
+                  </m:oMath>
+                </a14:m>
+                <a:r>
+                  <a:rPr lang="en-AU" dirty="0"/>
+                  <a:t> and real values </a:t>
+                </a:r>
+                <a14:m>
+                  <m:oMath xmlns:m="http://schemas.openxmlformats.org/officeDocument/2006/math">
+                    <m:sSub>
+                      <m:sSubPr>
+                        <m:ctrlPr>
+                          <a:rPr lang="en-AU" b="0" i="1" smtClean="0">
+                            <a:latin typeface="Cambria Math" panose="02040503050406030204" pitchFamily="18" charset="0"/>
+                          </a:rPr>
+                        </m:ctrlPr>
+                      </m:sSubPr>
+                      <m:e>
+                        <m:r>
+                          <a:rPr lang="en-AU" b="0" i="1" smtClean="0">
+                            <a:latin typeface="Cambria Math" panose="02040503050406030204" pitchFamily="18" charset="0"/>
+                          </a:rPr>
+                          <m:t>𝑦</m:t>
+                        </m:r>
+                      </m:e>
+                      <m:sub>
+                        <m:r>
+                          <a:rPr lang="en-AU" b="0" i="1" smtClean="0">
+                            <a:latin typeface="Cambria Math" panose="02040503050406030204" pitchFamily="18" charset="0"/>
+                          </a:rPr>
+                          <m:t>𝑖</m:t>
+                        </m:r>
+                      </m:sub>
+                    </m:sSub>
+                  </m:oMath>
+                </a14:m>
+                <a:r>
+                  <a:rPr lang="en-AU" dirty="0"/>
+                  <a:t> associated with each point </a:t>
+                </a:r>
+                <a14:m>
+                  <m:oMath xmlns:m="http://schemas.openxmlformats.org/officeDocument/2006/math">
+                    <m:sSub>
+                      <m:sSubPr>
+                        <m:ctrlPr>
+                          <a:rPr lang="en-AU" b="0" i="1" smtClean="0">
+                            <a:latin typeface="Cambria Math" panose="02040503050406030204" pitchFamily="18" charset="0"/>
+                          </a:rPr>
+                        </m:ctrlPr>
+                      </m:sSubPr>
+                      <m:e>
+                        <m:r>
+                          <a:rPr lang="en-AU" b="0" i="1" smtClean="0">
+                            <a:latin typeface="Cambria Math" panose="02040503050406030204" pitchFamily="18" charset="0"/>
+                          </a:rPr>
+                          <m:t>𝑥</m:t>
+                        </m:r>
+                      </m:e>
+                      <m:sub>
+                        <m:r>
+                          <a:rPr lang="en-AU" b="0" i="1" smtClean="0">
+                            <a:latin typeface="Cambria Math" panose="02040503050406030204" pitchFamily="18" charset="0"/>
+                          </a:rPr>
+                          <m:t>𝑖</m:t>
+                        </m:r>
+                      </m:sub>
+                    </m:sSub>
+                  </m:oMath>
+                </a14:m>
+                <a:r>
+                  <a:rPr lang="en-AU" dirty="0"/>
+                  <a:t>. </a:t>
+                </a:r>
+                <a:endParaRPr lang="en-AU" b="0" i="1" dirty="0">
+                  <a:latin typeface="Cambria Math" panose="02040503050406030204" pitchFamily="18" charset="0"/>
+                </a:endParaRPr>
+              </a:p>
+              <a:p>
+                <a:pPr marL="0" indent="0">
+                  <a:buNone/>
+                </a:pPr>
+                <a14:m>
+                  <m:oMathPara xmlns:m="http://schemas.openxmlformats.org/officeDocument/2006/math">
+                    <m:oMathParaPr>
+                      <m:jc m:val="centerGroup"/>
+                    </m:oMathParaPr>
+                    <m:oMath xmlns:m="http://schemas.openxmlformats.org/officeDocument/2006/math">
+                      <m:r>
+                        <a:rPr lang="en-AU" b="0" i="1" smtClean="0">
+                          <a:latin typeface="Cambria Math" panose="02040503050406030204" pitchFamily="18" charset="0"/>
+                        </a:rPr>
+                        <m:t>𝑦</m:t>
+                      </m:r>
+                      <m:r>
+                        <a:rPr lang="en-AU" b="0" i="1" smtClean="0">
+                          <a:latin typeface="Cambria Math" panose="02040503050406030204" pitchFamily="18" charset="0"/>
+                        </a:rPr>
+                        <m:t>=</m:t>
+                      </m:r>
+                      <m:r>
+                        <a:rPr lang="en-AU" b="0" i="1" smtClean="0">
+                          <a:latin typeface="Cambria Math" panose="02040503050406030204" pitchFamily="18" charset="0"/>
+                        </a:rPr>
+                        <m:t>𝑓</m:t>
+                      </m:r>
+                      <m:d>
+                        <m:dPr>
+                          <m:ctrlPr>
+                            <a:rPr lang="en-AU" b="0" i="1" smtClean="0">
+                              <a:latin typeface="Cambria Math" panose="02040503050406030204" pitchFamily="18" charset="0"/>
+                            </a:rPr>
+                          </m:ctrlPr>
+                        </m:dPr>
+                        <m:e>
+                          <m:sSub>
+                            <m:sSubPr>
+                              <m:ctrlPr>
+                                <a:rPr lang="en-AU" b="0" i="1" smtClean="0">
+                                  <a:latin typeface="Cambria Math" panose="02040503050406030204" pitchFamily="18" charset="0"/>
+                                </a:rPr>
+                              </m:ctrlPr>
+                            </m:sSubPr>
+                            <m:e>
+                              <m:r>
+                                <a:rPr lang="en-AU" b="0" i="1" smtClean="0">
+                                  <a:latin typeface="Cambria Math" panose="02040503050406030204" pitchFamily="18" charset="0"/>
+                                </a:rPr>
+                                <m:t>𝑥</m:t>
+                              </m:r>
+                            </m:e>
+                            <m:sub>
+                              <m:r>
+                                <a:rPr lang="en-AU" b="0" i="1" smtClean="0">
+                                  <a:latin typeface="Cambria Math" panose="02040503050406030204" pitchFamily="18" charset="0"/>
+                                </a:rPr>
+                                <m:t>𝑖</m:t>
+                              </m:r>
+                            </m:sub>
+                          </m:sSub>
+                        </m:e>
+                      </m:d>
+                      <m:r>
+                        <a:rPr lang="en-AU" b="0" i="1" smtClean="0">
+                          <a:latin typeface="Cambria Math" panose="02040503050406030204" pitchFamily="18" charset="0"/>
+                        </a:rPr>
+                        <m:t>+ </m:t>
+                      </m:r>
+                      <m:r>
+                        <a:rPr lang="en-AU" b="0" i="1" smtClean="0">
+                          <a:latin typeface="Cambria Math" panose="02040503050406030204" pitchFamily="18" charset="0"/>
+                          <a:ea typeface="Cambria Math" panose="02040503050406030204" pitchFamily="18" charset="0"/>
+                        </a:rPr>
+                        <m:t>𝜀</m:t>
+                      </m:r>
+                    </m:oMath>
+                  </m:oMathPara>
+                </a14:m>
+                <a:endParaRPr lang="en-AU" dirty="0"/>
+              </a:p>
+              <a:p>
+                <a:pPr marL="0" indent="0">
+                  <a:buNone/>
+                </a:pPr>
+                <a:r>
+                  <a:rPr lang="en-AU" dirty="0"/>
+                  <a:t>Where the noise, </a:t>
+                </a:r>
+                <a14:m>
+                  <m:oMath xmlns:m="http://schemas.openxmlformats.org/officeDocument/2006/math">
+                    <m:r>
+                      <a:rPr lang="en-AU" b="0" i="1" smtClean="0">
+                        <a:latin typeface="Cambria Math" panose="02040503050406030204" pitchFamily="18" charset="0"/>
+                        <a:ea typeface="Cambria Math" panose="02040503050406030204" pitchFamily="18" charset="0"/>
+                      </a:rPr>
+                      <m:t>𝜀</m:t>
+                    </m:r>
+                  </m:oMath>
+                </a14:m>
+                <a:r>
+                  <a:rPr lang="en-AU" dirty="0"/>
+                  <a:t>, has zero mean and variance </a:t>
+                </a:r>
+                <a14:m>
+                  <m:oMath xmlns:m="http://schemas.openxmlformats.org/officeDocument/2006/math">
+                    <m:sSup>
+                      <m:sSupPr>
+                        <m:ctrlPr>
+                          <a:rPr lang="en-AU" b="0" i="1" smtClean="0">
+                            <a:latin typeface="Cambria Math" panose="02040503050406030204" pitchFamily="18" charset="0"/>
+                            <a:ea typeface="Cambria Math" panose="02040503050406030204" pitchFamily="18" charset="0"/>
+                          </a:rPr>
+                        </m:ctrlPr>
+                      </m:sSupPr>
+                      <m:e>
+                        <m:r>
+                          <a:rPr lang="en-AU" i="1" smtClean="0">
+                            <a:latin typeface="Cambria Math" panose="02040503050406030204" pitchFamily="18" charset="0"/>
+                            <a:ea typeface="Cambria Math" panose="02040503050406030204" pitchFamily="18" charset="0"/>
+                          </a:rPr>
+                          <m:t>𝜎</m:t>
+                        </m:r>
+                      </m:e>
+                      <m:sup>
+                        <m:r>
+                          <a:rPr lang="en-AU" b="0" i="1" smtClean="0">
+                            <a:latin typeface="Cambria Math" panose="02040503050406030204" pitchFamily="18" charset="0"/>
+                            <a:ea typeface="Cambria Math" panose="02040503050406030204" pitchFamily="18" charset="0"/>
+                          </a:rPr>
+                          <m:t>2</m:t>
+                        </m:r>
+                      </m:sup>
+                    </m:sSup>
+                    <m:r>
+                      <a:rPr lang="en-AU" b="0" i="1" smtClean="0">
+                        <a:latin typeface="Cambria Math" panose="02040503050406030204" pitchFamily="18" charset="0"/>
+                        <a:ea typeface="Cambria Math" panose="02040503050406030204" pitchFamily="18" charset="0"/>
+                      </a:rPr>
+                      <m:t>.</m:t>
+                    </m:r>
+                  </m:oMath>
+                </a14:m>
+                <a:endParaRPr lang="en-AU" dirty="0"/>
+              </a:p>
+              <a:p>
+                <a:r>
+                  <a:rPr lang="en-AU" dirty="0"/>
+                  <a:t>We want to find a function </a:t>
+                </a:r>
+                <a14:m>
+                  <m:oMath xmlns:m="http://schemas.openxmlformats.org/officeDocument/2006/math">
+                    <m:sSub>
+                      <m:sSubPr>
+                        <m:ctrlPr>
+                          <a:rPr lang="en-AU" b="0" i="1" smtClean="0">
+                            <a:latin typeface="Cambria Math" panose="02040503050406030204" pitchFamily="18" charset="0"/>
+                          </a:rPr>
+                        </m:ctrlPr>
+                      </m:sSubPr>
+                      <m:e>
+                        <m:r>
+                          <a:rPr lang="en-AU" b="0" i="1" smtClean="0">
+                            <a:latin typeface="Cambria Math" panose="02040503050406030204" pitchFamily="18" charset="0"/>
+                          </a:rPr>
+                          <m:t>𝑓</m:t>
+                        </m:r>
+                      </m:e>
+                      <m:sub>
+                        <m:r>
+                          <a:rPr lang="en-AU" b="0" i="1" smtClean="0">
+                            <a:latin typeface="Cambria Math" panose="02040503050406030204" pitchFamily="18" charset="0"/>
+                          </a:rPr>
+                          <m:t>𝑐𝑎𝑝</m:t>
+                        </m:r>
+                      </m:sub>
+                    </m:sSub>
+                    <m:r>
+                      <a:rPr lang="en-AU" b="0" i="1" smtClean="0">
+                        <a:latin typeface="Cambria Math" panose="02040503050406030204" pitchFamily="18" charset="0"/>
+                      </a:rPr>
+                      <m:t>(</m:t>
+                    </m:r>
+                    <m:r>
+                      <a:rPr lang="en-AU" b="0" i="1" smtClean="0">
+                        <a:latin typeface="Cambria Math" panose="02040503050406030204" pitchFamily="18" charset="0"/>
+                      </a:rPr>
+                      <m:t>𝑥</m:t>
+                    </m:r>
+                    <m:r>
+                      <a:rPr lang="en-AU" b="0" i="1" smtClean="0">
+                        <a:latin typeface="Cambria Math" panose="02040503050406030204" pitchFamily="18" charset="0"/>
+                      </a:rPr>
+                      <m:t>,</m:t>
+                    </m:r>
+                    <m:r>
+                      <a:rPr lang="en-AU" b="0" i="1" smtClean="0">
+                        <a:latin typeface="Cambria Math" panose="02040503050406030204" pitchFamily="18" charset="0"/>
+                      </a:rPr>
+                      <m:t>𝐷</m:t>
+                    </m:r>
+                    <m:r>
+                      <a:rPr lang="en-AU" b="0" i="1" smtClean="0">
+                        <a:latin typeface="Cambria Math" panose="02040503050406030204" pitchFamily="18" charset="0"/>
+                      </a:rPr>
+                      <m:t>)</m:t>
+                    </m:r>
+                  </m:oMath>
+                </a14:m>
+                <a:r>
+                  <a:rPr lang="en-AU" dirty="0"/>
+                  <a:t>, that approximates the true function </a:t>
+                </a:r>
+                <a14:m>
+                  <m:oMath xmlns:m="http://schemas.openxmlformats.org/officeDocument/2006/math">
+                    <m:r>
+                      <a:rPr lang="en-AU" b="0" i="1" smtClean="0">
+                        <a:latin typeface="Cambria Math" panose="02040503050406030204" pitchFamily="18" charset="0"/>
+                      </a:rPr>
+                      <m:t>𝑓</m:t>
+                    </m:r>
+                    <m:d>
+                      <m:dPr>
+                        <m:ctrlPr>
+                          <a:rPr lang="en-AU" b="0" i="1" smtClean="0">
+                            <a:latin typeface="Cambria Math" panose="02040503050406030204" pitchFamily="18" charset="0"/>
+                          </a:rPr>
+                        </m:ctrlPr>
+                      </m:dPr>
+                      <m:e>
+                        <m:r>
+                          <a:rPr lang="en-AU" b="0" i="1" smtClean="0">
+                            <a:latin typeface="Cambria Math" panose="02040503050406030204" pitchFamily="18" charset="0"/>
+                          </a:rPr>
+                          <m:t>𝑥</m:t>
+                        </m:r>
+                      </m:e>
+                    </m:d>
+                  </m:oMath>
+                </a14:m>
+                <a:endParaRPr lang="en-AU" dirty="0"/>
+              </a:p>
+            </p:txBody>
+          </p:sp>
+        </mc:Choice>
+        <mc:Fallback xmlns="">
+          <p:sp>
+            <p:nvSpPr>
+              <p:cNvPr id="25" name="Content Placeholder 2">
+                <a:extLst>
+                  <a:ext uri="{FF2B5EF4-FFF2-40B4-BE49-F238E27FC236}">
+                    <a16:creationId xmlns:a16="http://schemas.microsoft.com/office/drawing/2014/main" id="{B78EE824-AF7B-C85F-18D4-24BCC4A5273C}"/>
+                  </a:ext>
+                </a:extLst>
+              </p:cNvPr>
+              <p:cNvSpPr txBox="1">
+                <a:spLocks noRot="1" noChangeAspect="1" noMove="1" noResize="1" noEditPoints="1" noAdjustHandles="1" noChangeArrowheads="1" noChangeShapeType="1" noTextEdit="1"/>
+              </p:cNvSpPr>
+              <p:nvPr/>
+            </p:nvSpPr>
+            <p:spPr>
+              <a:xfrm>
+                <a:off x="5823857" y="1825625"/>
+                <a:ext cx="5181600" cy="4351338"/>
+              </a:xfrm>
+              <a:prstGeom prst="rect">
+                <a:avLst/>
+              </a:prstGeom>
+              <a:blipFill>
+                <a:blip r:embed="rId2"/>
+                <a:stretch>
+                  <a:fillRect l="-2353" t="-2241" r="-3882" b="-840"/>
+                </a:stretch>
+              </a:blipFill>
+            </p:spPr>
+            <p:txBody>
+              <a:bodyPr/>
+              <a:lstStyle/>
+              <a:p>
+                <a:r>
+                  <a:rPr lang="en-AU">
+                    <a:noFill/>
+                  </a:rPr>
+                  <a:t> </a:t>
+                </a:r>
+              </a:p>
+            </p:txBody>
+          </p:sp>
+        </mc:Fallback>
+      </mc:AlternateContent>
+      <p:sp>
+        <p:nvSpPr>
+          <p:cNvPr id="4" name="Footer Placeholder 3">
+            <a:extLst>
+              <a:ext uri="{FF2B5EF4-FFF2-40B4-BE49-F238E27FC236}">
+                <a16:creationId xmlns:a16="http://schemas.microsoft.com/office/drawing/2014/main" id="{60979901-009C-F713-7C09-0BDFF62594F9}"/>
+              </a:ext>
+            </a:extLst>
+          </p:cNvPr>
+          <p:cNvSpPr>
+            <a:spLocks noGrp="1"/>
+          </p:cNvSpPr>
+          <p:nvPr>
+            <p:ph type="ftr" sz="quarter" idx="11"/>
+          </p:nvPr>
+        </p:nvSpPr>
+        <p:spPr/>
+        <p:txBody>
+          <a:bodyPr/>
+          <a:lstStyle/>
+          <a:p>
+            <a:r>
+              <a:rPr lang="en-US"/>
+              <a:t>M. Meenakshi Sundaram, S. Ganesh</a:t>
+            </a:r>
+          </a:p>
+        </p:txBody>
+      </p:sp>
+    </p:spTree>
+    <p:extLst>
+      <p:ext uri="{BB962C8B-B14F-4D97-AF65-F5344CB8AC3E}">
+        <p14:creationId xmlns:p14="http://schemas.microsoft.com/office/powerpoint/2010/main" val="770202501"/>
+      </p:ext>
+    </p:extLst>
+  </p:cSld>
+  <p:clrMapOvr>
+    <a:masterClrMapping/>
+  </p:clrMapOvr>
+</p:sld>
+</file>
+
+<file path=ppt/slides/slide11.xml><?xml version="1.0" encoding="utf-8"?>
+<p:sld xmlns:a="http://schemas.openxmlformats.org/drawingml/2006/main" xmlns:r="http://schemas.openxmlformats.org/officeDocument/2006/relationships" xmlns:p="http://schemas.openxmlformats.org/presentationml/2006/main" show="0">
+  <p:cSld>
+    <p:spTree>
+      <p:nvGrpSpPr>
+        <p:cNvPr id="1" name=""/>
+        <p:cNvGrpSpPr/>
+        <p:nvPr/>
+      </p:nvGrpSpPr>
+      <p:grpSpPr>
+        <a:xfrm>
+          <a:off x="0" y="0"/>
+          <a:ext cx="0" cy="0"/>
+          <a:chOff x="0" y="0"/>
+          <a:chExt cx="0" cy="0"/>
+        </a:xfrm>
+      </p:grpSpPr>
+      <mc:AlternateContent xmlns:mc="http://schemas.openxmlformats.org/markup-compatibility/2006" xmlns:a14="http://schemas.microsoft.com/office/drawing/2010/main">
+        <mc:Choice Requires="a14">
+          <p:sp>
+            <p:nvSpPr>
+              <p:cNvPr id="3" name="Content Placeholder 2">
+                <a:extLst>
+                  <a:ext uri="{FF2B5EF4-FFF2-40B4-BE49-F238E27FC236}">
+                    <a16:creationId xmlns:a16="http://schemas.microsoft.com/office/drawing/2014/main" id="{9B247013-8D09-94A6-F8CF-80FC572850C3}"/>
+                  </a:ext>
+                </a:extLst>
+              </p:cNvPr>
+              <p:cNvSpPr>
+                <a:spLocks noGrp="1"/>
+              </p:cNvSpPr>
+              <p:nvPr>
+                <p:ph idx="1"/>
+              </p:nvPr>
+            </p:nvSpPr>
+            <p:spPr>
+              <a:xfrm>
+                <a:off x="831997" y="305168"/>
+                <a:ext cx="10528005" cy="6095631"/>
+              </a:xfrm>
+            </p:spPr>
+            <p:txBody>
+              <a:bodyPr/>
+              <a:lstStyle/>
+              <a:p>
+                <a14:m>
+                  <m:oMath xmlns:m="http://schemas.openxmlformats.org/officeDocument/2006/math">
+                    <m:r>
+                      <a:rPr lang="en-AU" b="0" i="1" smtClean="0">
+                        <a:latin typeface="Cambria Math" panose="02040503050406030204" pitchFamily="18" charset="0"/>
+                      </a:rPr>
+                      <m:t>𝐷</m:t>
+                    </m:r>
+                    <m:r>
+                      <a:rPr lang="en-AU" b="0" i="1" smtClean="0">
+                        <a:latin typeface="Cambria Math" panose="02040503050406030204" pitchFamily="18" charset="0"/>
+                      </a:rPr>
+                      <m:t>=</m:t>
+                    </m:r>
+                    <m:d>
+                      <m:dPr>
+                        <m:begChr m:val="{"/>
+                        <m:endChr m:val="}"/>
+                        <m:ctrlPr>
+                          <a:rPr lang="en-AU" b="0" i="1" smtClean="0">
+                            <a:latin typeface="Cambria Math" panose="02040503050406030204" pitchFamily="18" charset="0"/>
+                          </a:rPr>
+                        </m:ctrlPr>
+                      </m:dPr>
+                      <m:e>
+                        <m:d>
+                          <m:dPr>
+                            <m:ctrlPr>
+                              <a:rPr lang="en-AU" b="0" i="1" smtClean="0">
+                                <a:latin typeface="Cambria Math" panose="02040503050406030204" pitchFamily="18" charset="0"/>
+                              </a:rPr>
+                            </m:ctrlPr>
+                          </m:dPr>
+                          <m:e>
+                            <m:sSub>
+                              <m:sSubPr>
+                                <m:ctrlPr>
+                                  <a:rPr lang="en-AU" b="0" i="1" smtClean="0">
+                                    <a:latin typeface="Cambria Math" panose="02040503050406030204" pitchFamily="18" charset="0"/>
+                                  </a:rPr>
+                                </m:ctrlPr>
+                              </m:sSubPr>
+                              <m:e>
+                                <m:r>
+                                  <a:rPr lang="en-AU" b="0" i="1" smtClean="0">
+                                    <a:latin typeface="Cambria Math" panose="02040503050406030204" pitchFamily="18" charset="0"/>
+                                  </a:rPr>
+                                  <m:t>𝑥</m:t>
+                                </m:r>
+                              </m:e>
+                              <m:sub>
+                                <m:r>
+                                  <a:rPr lang="en-AU" b="0" i="1" smtClean="0">
+                                    <a:latin typeface="Cambria Math" panose="02040503050406030204" pitchFamily="18" charset="0"/>
+                                  </a:rPr>
+                                  <m:t>1</m:t>
+                                </m:r>
+                              </m:sub>
+                            </m:sSub>
+                            <m:r>
+                              <a:rPr lang="en-AU" b="0" i="1" smtClean="0">
+                                <a:latin typeface="Cambria Math" panose="02040503050406030204" pitchFamily="18" charset="0"/>
+                              </a:rPr>
+                              <m:t>,</m:t>
+                            </m:r>
+                            <m:sSub>
+                              <m:sSubPr>
+                                <m:ctrlPr>
+                                  <a:rPr lang="en-AU" b="0" i="1" smtClean="0">
+                                    <a:latin typeface="Cambria Math" panose="02040503050406030204" pitchFamily="18" charset="0"/>
+                                  </a:rPr>
+                                </m:ctrlPr>
+                              </m:sSubPr>
+                              <m:e>
+                                <m:r>
+                                  <a:rPr lang="en-AU" b="0" i="1" smtClean="0">
+                                    <a:latin typeface="Cambria Math" panose="02040503050406030204" pitchFamily="18" charset="0"/>
+                                  </a:rPr>
+                                  <m:t>𝑦</m:t>
+                                </m:r>
+                              </m:e>
+                              <m:sub>
+                                <m:r>
+                                  <a:rPr lang="en-AU" b="0" i="1" smtClean="0">
+                                    <a:latin typeface="Cambria Math" panose="02040503050406030204" pitchFamily="18" charset="0"/>
+                                  </a:rPr>
+                                  <m:t>1</m:t>
+                                </m:r>
+                              </m:sub>
+                            </m:sSub>
+                          </m:e>
+                        </m:d>
+                        <m:r>
+                          <a:rPr lang="en-AU" b="0" i="1" smtClean="0">
+                            <a:latin typeface="Cambria Math" panose="02040503050406030204" pitchFamily="18" charset="0"/>
+                          </a:rPr>
+                          <m:t>,</m:t>
+                        </m:r>
+                        <m:d>
+                          <m:dPr>
+                            <m:ctrlPr>
+                              <a:rPr lang="en-AU" b="0" i="1" smtClean="0">
+                                <a:latin typeface="Cambria Math" panose="02040503050406030204" pitchFamily="18" charset="0"/>
+                              </a:rPr>
+                            </m:ctrlPr>
+                          </m:dPr>
+                          <m:e>
+                            <m:sSub>
+                              <m:sSubPr>
+                                <m:ctrlPr>
+                                  <a:rPr lang="en-AU" b="0" i="1" smtClean="0">
+                                    <a:latin typeface="Cambria Math" panose="02040503050406030204" pitchFamily="18" charset="0"/>
+                                  </a:rPr>
+                                </m:ctrlPr>
+                              </m:sSubPr>
+                              <m:e>
+                                <m:r>
+                                  <a:rPr lang="en-AU" b="0" i="1" smtClean="0">
+                                    <a:latin typeface="Cambria Math" panose="02040503050406030204" pitchFamily="18" charset="0"/>
+                                  </a:rPr>
+                                  <m:t>𝑥</m:t>
+                                </m:r>
+                              </m:e>
+                              <m:sub>
+                                <m:r>
+                                  <a:rPr lang="en-AU" b="0" i="1" smtClean="0">
+                                    <a:latin typeface="Cambria Math" panose="02040503050406030204" pitchFamily="18" charset="0"/>
+                                  </a:rPr>
+                                  <m:t>2</m:t>
+                                </m:r>
+                              </m:sub>
+                            </m:sSub>
+                            <m:r>
+                              <a:rPr lang="en-AU" b="0" i="1" smtClean="0">
+                                <a:latin typeface="Cambria Math" panose="02040503050406030204" pitchFamily="18" charset="0"/>
+                              </a:rPr>
+                              <m:t>,</m:t>
+                            </m:r>
+                            <m:sSub>
+                              <m:sSubPr>
+                                <m:ctrlPr>
+                                  <a:rPr lang="en-AU" b="0" i="1" smtClean="0">
+                                    <a:latin typeface="Cambria Math" panose="02040503050406030204" pitchFamily="18" charset="0"/>
+                                  </a:rPr>
+                                </m:ctrlPr>
+                              </m:sSubPr>
+                              <m:e>
+                                <m:r>
+                                  <a:rPr lang="en-AU" b="0" i="1" smtClean="0">
+                                    <a:latin typeface="Cambria Math" panose="02040503050406030204" pitchFamily="18" charset="0"/>
+                                  </a:rPr>
+                                  <m:t>𝑦</m:t>
+                                </m:r>
+                              </m:e>
+                              <m:sub>
+                                <m:r>
+                                  <a:rPr lang="en-AU" b="0" i="1" smtClean="0">
+                                    <a:latin typeface="Cambria Math" panose="02040503050406030204" pitchFamily="18" charset="0"/>
+                                  </a:rPr>
+                                  <m:t>2</m:t>
+                                </m:r>
+                              </m:sub>
+                            </m:sSub>
+                          </m:e>
+                        </m:d>
+                        <m:r>
+                          <a:rPr lang="en-AU" b="0" i="1" smtClean="0">
+                            <a:latin typeface="Cambria Math" panose="02040503050406030204" pitchFamily="18" charset="0"/>
+                          </a:rPr>
+                          <m:t>,…,</m:t>
+                        </m:r>
+                        <m:d>
+                          <m:dPr>
+                            <m:ctrlPr>
+                              <a:rPr lang="en-AU" b="0" i="1" smtClean="0">
+                                <a:latin typeface="Cambria Math" panose="02040503050406030204" pitchFamily="18" charset="0"/>
+                              </a:rPr>
+                            </m:ctrlPr>
+                          </m:dPr>
+                          <m:e>
+                            <m:sSub>
+                              <m:sSubPr>
+                                <m:ctrlPr>
+                                  <a:rPr lang="en-AU" b="0" i="1" smtClean="0">
+                                    <a:latin typeface="Cambria Math" panose="02040503050406030204" pitchFamily="18" charset="0"/>
+                                  </a:rPr>
+                                </m:ctrlPr>
+                              </m:sSubPr>
+                              <m:e>
+                                <m:r>
+                                  <a:rPr lang="en-AU" b="0" i="1" smtClean="0">
+                                    <a:latin typeface="Cambria Math" panose="02040503050406030204" pitchFamily="18" charset="0"/>
+                                  </a:rPr>
+                                  <m:t>𝑥</m:t>
+                                </m:r>
+                              </m:e>
+                              <m:sub>
+                                <m:r>
+                                  <a:rPr lang="en-AU" b="0" i="1" smtClean="0">
+                                    <a:latin typeface="Cambria Math" panose="02040503050406030204" pitchFamily="18" charset="0"/>
+                                  </a:rPr>
+                                  <m:t>𝑛</m:t>
+                                </m:r>
+                              </m:sub>
+                            </m:sSub>
+                            <m:r>
+                              <a:rPr lang="en-AU" b="0" i="1" smtClean="0">
+                                <a:latin typeface="Cambria Math" panose="02040503050406030204" pitchFamily="18" charset="0"/>
+                              </a:rPr>
+                              <m:t>,</m:t>
+                            </m:r>
+                            <m:sSub>
+                              <m:sSubPr>
+                                <m:ctrlPr>
+                                  <a:rPr lang="en-AU" b="0" i="1" smtClean="0">
+                                    <a:latin typeface="Cambria Math" panose="02040503050406030204" pitchFamily="18" charset="0"/>
+                                  </a:rPr>
+                                </m:ctrlPr>
+                              </m:sSubPr>
+                              <m:e>
+                                <m:r>
+                                  <a:rPr lang="en-AU" b="0" i="1" smtClean="0">
+                                    <a:latin typeface="Cambria Math" panose="02040503050406030204" pitchFamily="18" charset="0"/>
+                                  </a:rPr>
+                                  <m:t>𝑦</m:t>
+                                </m:r>
+                              </m:e>
+                              <m:sub>
+                                <m:r>
+                                  <a:rPr lang="en-AU" b="0" i="1" smtClean="0">
+                                    <a:latin typeface="Cambria Math" panose="02040503050406030204" pitchFamily="18" charset="0"/>
+                                  </a:rPr>
+                                  <m:t>𝑛</m:t>
+                                </m:r>
+                              </m:sub>
+                            </m:sSub>
+                          </m:e>
+                        </m:d>
+                      </m:e>
+                    </m:d>
+                  </m:oMath>
+                </a14:m>
+                <a:endParaRPr lang="en-AU" dirty="0"/>
+              </a:p>
+              <a:p>
+                <a14:m>
+                  <m:oMath xmlns:m="http://schemas.openxmlformats.org/officeDocument/2006/math">
+                    <m:r>
+                      <a:rPr lang="en-AU" b="0" i="1" smtClean="0">
+                        <a:latin typeface="Cambria Math" panose="02040503050406030204" pitchFamily="18" charset="0"/>
+                      </a:rPr>
+                      <m:t>𝐵𝑖𝑎𝑠</m:t>
+                    </m:r>
+                    <m:r>
+                      <a:rPr lang="en-AU" b="0" i="1" smtClean="0">
+                        <a:latin typeface="Cambria Math" panose="02040503050406030204" pitchFamily="18" charset="0"/>
+                      </a:rPr>
+                      <m:t>=</m:t>
+                    </m:r>
+                    <m:sSup>
+                      <m:sSupPr>
+                        <m:ctrlPr>
+                          <a:rPr lang="en-AU" b="0" i="1" smtClean="0">
+                            <a:latin typeface="Cambria Math" panose="02040503050406030204" pitchFamily="18" charset="0"/>
+                          </a:rPr>
+                        </m:ctrlPr>
+                      </m:sSupPr>
+                      <m:e>
+                        <m:d>
+                          <m:dPr>
+                            <m:ctrlPr>
+                              <a:rPr lang="en-AU" b="0" i="1" smtClean="0">
+                                <a:latin typeface="Cambria Math" panose="02040503050406030204" pitchFamily="18" charset="0"/>
+                              </a:rPr>
+                            </m:ctrlPr>
+                          </m:dPr>
+                          <m:e>
+                            <m:r>
+                              <a:rPr lang="en-AU" b="0" i="1" smtClean="0">
+                                <a:latin typeface="Cambria Math" panose="02040503050406030204" pitchFamily="18" charset="0"/>
+                              </a:rPr>
+                              <m:t>𝑦</m:t>
+                            </m:r>
+                            <m:r>
+                              <a:rPr lang="en-AU" b="0" i="1" smtClean="0">
+                                <a:latin typeface="Cambria Math" panose="02040503050406030204" pitchFamily="18" charset="0"/>
+                              </a:rPr>
+                              <m:t>−</m:t>
+                            </m:r>
+                            <m:sSub>
+                              <m:sSubPr>
+                                <m:ctrlPr>
+                                  <a:rPr lang="en-AU" b="0" i="1" smtClean="0">
+                                    <a:latin typeface="Cambria Math" panose="02040503050406030204" pitchFamily="18" charset="0"/>
+                                  </a:rPr>
+                                </m:ctrlPr>
+                              </m:sSubPr>
+                              <m:e>
+                                <m:r>
+                                  <a:rPr lang="en-AU" b="0" i="1" smtClean="0">
+                                    <a:latin typeface="Cambria Math" panose="02040503050406030204" pitchFamily="18" charset="0"/>
+                                  </a:rPr>
+                                  <m:t>𝑓</m:t>
+                                </m:r>
+                              </m:e>
+                              <m:sub>
+                                <m:r>
+                                  <a:rPr lang="en-AU" b="0" i="1" smtClean="0">
+                                    <a:latin typeface="Cambria Math" panose="02040503050406030204" pitchFamily="18" charset="0"/>
+                                  </a:rPr>
+                                  <m:t>𝑐𝑎𝑝</m:t>
+                                </m:r>
+                              </m:sub>
+                            </m:sSub>
+                            <m:d>
+                              <m:dPr>
+                                <m:ctrlPr>
+                                  <a:rPr lang="en-AU" b="0" i="1" smtClean="0">
+                                    <a:latin typeface="Cambria Math" panose="02040503050406030204" pitchFamily="18" charset="0"/>
+                                  </a:rPr>
+                                </m:ctrlPr>
+                              </m:dPr>
+                              <m:e>
+                                <m:r>
+                                  <a:rPr lang="en-AU" b="0" i="1" smtClean="0">
+                                    <a:latin typeface="Cambria Math" panose="02040503050406030204" pitchFamily="18" charset="0"/>
+                                  </a:rPr>
+                                  <m:t>𝑥</m:t>
+                                </m:r>
+                                <m:r>
+                                  <a:rPr lang="en-AU" b="0" i="1" smtClean="0">
+                                    <a:latin typeface="Cambria Math" panose="02040503050406030204" pitchFamily="18" charset="0"/>
+                                  </a:rPr>
+                                  <m:t>;</m:t>
+                                </m:r>
+                                <m:r>
+                                  <a:rPr lang="en-AU" b="0" i="1" smtClean="0">
+                                    <a:latin typeface="Cambria Math" panose="02040503050406030204" pitchFamily="18" charset="0"/>
+                                  </a:rPr>
+                                  <m:t>𝐷</m:t>
+                                </m:r>
+                              </m:e>
+                            </m:d>
+                          </m:e>
+                        </m:d>
+                      </m:e>
+                      <m:sup>
+                        <m:r>
+                          <a:rPr lang="en-AU" b="0" i="1" smtClean="0">
+                            <a:latin typeface="Cambria Math" panose="02040503050406030204" pitchFamily="18" charset="0"/>
+                          </a:rPr>
+                          <m:t>2</m:t>
+                        </m:r>
+                      </m:sup>
+                    </m:sSup>
+                  </m:oMath>
+                </a14:m>
+                <a:endParaRPr lang="en-AU" dirty="0"/>
+              </a:p>
+              <a:p>
+                <a:r>
+                  <a:rPr lang="en-AU" dirty="0"/>
+                  <a:t>Variance error:</a:t>
+                </a:r>
+              </a:p>
+              <a:p>
+                <a:pPr lvl="1"/>
+                <a:r>
+                  <a:rPr lang="en-AU" dirty="0"/>
+                  <a:t>Variance error is variability of a target function's form with respect to different training sets. Models with small variance error will not change much if you replace couple of samples in training set. Models with high variance might be affected even with small changes in training set.</a:t>
+                </a:r>
+              </a:p>
+              <a:p>
+                <a:r>
+                  <a:rPr lang="en-AU" dirty="0"/>
+                  <a:t>If the model learns to fit very closely to the points on a particular dataset, when it used to predict on another dataset it may not predict as accurately as it did in the first.</a:t>
+                </a:r>
+              </a:p>
+              <a:p>
+                <a:r>
+                  <a:rPr lang="en-AU" dirty="0"/>
+                  <a:t>Variance is the difference in the fits between different datasets.</a:t>
+                </a:r>
+              </a:p>
+              <a:p>
+                <a:r>
+                  <a:rPr lang="en-AU" dirty="0">
+                    <a:hlinkClick r:id="rId2"/>
+                  </a:rPr>
+                  <a:t>https://www.machinelearningplus.com/machine-learning/bias-variance-tradeoff/</a:t>
+                </a:r>
+                <a:endParaRPr lang="en-AU" dirty="0"/>
+              </a:p>
+              <a:p>
+                <a:endParaRPr lang="en-AU" dirty="0"/>
+              </a:p>
+              <a:p>
+                <a:endParaRPr lang="en-AU" dirty="0"/>
+              </a:p>
+            </p:txBody>
+          </p:sp>
+        </mc:Choice>
+        <mc:Fallback xmlns="">
+          <p:sp>
+            <p:nvSpPr>
+              <p:cNvPr id="3" name="Content Placeholder 2">
+                <a:extLst>
+                  <a:ext uri="{FF2B5EF4-FFF2-40B4-BE49-F238E27FC236}">
+                    <a16:creationId xmlns:a16="http://schemas.microsoft.com/office/drawing/2014/main" id="{9B247013-8D09-94A6-F8CF-80FC572850C3}"/>
+                  </a:ext>
+                </a:extLst>
+              </p:cNvPr>
+              <p:cNvSpPr>
+                <a:spLocks noGrp="1" noRot="1" noChangeAspect="1" noMove="1" noResize="1" noEditPoints="1" noAdjustHandles="1" noChangeArrowheads="1" noChangeShapeType="1" noTextEdit="1"/>
+              </p:cNvSpPr>
+              <p:nvPr>
+                <p:ph idx="1"/>
+              </p:nvPr>
+            </p:nvSpPr>
+            <p:spPr>
+              <a:xfrm>
+                <a:off x="831997" y="305168"/>
+                <a:ext cx="10528005" cy="6095631"/>
+              </a:xfrm>
+              <a:blipFill>
+                <a:blip r:embed="rId3"/>
+                <a:stretch>
+                  <a:fillRect l="-1042" r="-1505"/>
+                </a:stretch>
+              </a:blipFill>
+            </p:spPr>
+            <p:txBody>
+              <a:bodyPr/>
+              <a:lstStyle/>
+              <a:p>
+                <a:r>
+                  <a:rPr lang="en-AU">
+                    <a:noFill/>
+                  </a:rPr>
+                  <a:t> </a:t>
+                </a:r>
+              </a:p>
+            </p:txBody>
+          </p:sp>
+        </mc:Fallback>
+      </mc:AlternateContent>
+      <p:sp>
+        <p:nvSpPr>
+          <p:cNvPr id="2" name="Footer Placeholder 1">
+            <a:extLst>
+              <a:ext uri="{FF2B5EF4-FFF2-40B4-BE49-F238E27FC236}">
+                <a16:creationId xmlns:a16="http://schemas.microsoft.com/office/drawing/2014/main" id="{39C093CC-FCD5-3F16-A54D-A99B2B3A5F3A}"/>
+              </a:ext>
+            </a:extLst>
+          </p:cNvPr>
+          <p:cNvSpPr>
+            <a:spLocks noGrp="1"/>
+          </p:cNvSpPr>
+          <p:nvPr>
+            <p:ph type="ftr" sz="quarter" idx="11"/>
+          </p:nvPr>
+        </p:nvSpPr>
+        <p:spPr/>
+        <p:txBody>
+          <a:bodyPr/>
+          <a:lstStyle/>
+          <a:p>
+            <a:r>
+              <a:rPr lang="en-US"/>
+              <a:t>M. Meenakshi Sundaram, S. Ganesh</a:t>
+            </a:r>
+          </a:p>
+        </p:txBody>
+      </p:sp>
+    </p:spTree>
+    <p:extLst>
+      <p:ext uri="{BB962C8B-B14F-4D97-AF65-F5344CB8AC3E}">
+        <p14:creationId xmlns:p14="http://schemas.microsoft.com/office/powerpoint/2010/main" val="2506745509"/>
+      </p:ext>
+    </p:extLst>
+  </p:cSld>
+  <p:clrMapOvr>
+    <a:masterClrMapping/>
+  </p:clrMapOvr>
+</p:sld>
+</file>
+
+<file path=ppt/slides/slide12.xml><?xml version="1.0" encoding="utf-8"?>
+<p:sld xmlns:a="http://schemas.openxmlformats.org/drawingml/2006/main" xmlns:r="http://schemas.openxmlformats.org/officeDocument/2006/relationships" xmlns:p="http://schemas.openxmlformats.org/presentationml/2006/main" show="0">
+  <p:cSld>
+    <p:spTree>
+      <p:nvGrpSpPr>
+        <p:cNvPr id="1" name=""/>
+        <p:cNvGrpSpPr/>
+        <p:nvPr/>
+      </p:nvGrpSpPr>
+      <p:grpSpPr>
+        <a:xfrm>
+          <a:off x="0" y="0"/>
+          <a:ext cx="0" cy="0"/>
+          <a:chOff x="0" y="0"/>
+          <a:chExt cx="0" cy="0"/>
+        </a:xfrm>
+      </p:grpSpPr>
+      <p:sp>
+        <p:nvSpPr>
+          <p:cNvPr id="3" name="Content Placeholder 2">
+            <a:extLst>
+              <a:ext uri="{FF2B5EF4-FFF2-40B4-BE49-F238E27FC236}">
+                <a16:creationId xmlns:a16="http://schemas.microsoft.com/office/drawing/2014/main" id="{9B465D01-077F-9044-88F1-32B5D5B3ED62}"/>
+              </a:ext>
+            </a:extLst>
+          </p:cNvPr>
+          <p:cNvSpPr>
+            <a:spLocks noGrp="1"/>
+          </p:cNvSpPr>
+          <p:nvPr>
+            <p:ph idx="1"/>
+          </p:nvPr>
+        </p:nvSpPr>
+        <p:spPr>
+          <a:xfrm>
+            <a:off x="838200" y="308344"/>
+            <a:ext cx="10515600" cy="5868619"/>
+          </a:xfrm>
+        </p:spPr>
+        <p:txBody>
+          <a:bodyPr/>
+          <a:lstStyle/>
+          <a:p>
+            <a:r>
+              <a:rPr lang="en-AU" dirty="0"/>
+              <a:t>If a model has high bias, then it implies that the model is too simple and does not capture the relationship between the variables. This is called the </a:t>
+            </a:r>
+            <a:r>
+              <a:rPr lang="en-AU" b="1" dirty="0"/>
+              <a:t>underfitting</a:t>
+            </a:r>
+            <a:r>
+              <a:rPr lang="en-AU" dirty="0"/>
+              <a:t> of data.</a:t>
+            </a:r>
+          </a:p>
+          <a:p>
+            <a:endParaRPr lang="en-AU" dirty="0"/>
+          </a:p>
+        </p:txBody>
+      </p:sp>
+      <p:sp>
+        <p:nvSpPr>
+          <p:cNvPr id="2" name="Footer Placeholder 1">
+            <a:extLst>
+              <a:ext uri="{FF2B5EF4-FFF2-40B4-BE49-F238E27FC236}">
+                <a16:creationId xmlns:a16="http://schemas.microsoft.com/office/drawing/2014/main" id="{84687A66-F5BD-3206-2BE1-FCA554D8E165}"/>
+              </a:ext>
+            </a:extLst>
+          </p:cNvPr>
+          <p:cNvSpPr>
+            <a:spLocks noGrp="1"/>
+          </p:cNvSpPr>
+          <p:nvPr>
+            <p:ph type="ftr" sz="quarter" idx="11"/>
+          </p:nvPr>
+        </p:nvSpPr>
+        <p:spPr/>
+        <p:txBody>
+          <a:bodyPr/>
+          <a:lstStyle/>
+          <a:p>
+            <a:r>
+              <a:rPr lang="en-US"/>
+              <a:t>M. Meenakshi Sundaram, S. Ganesh</a:t>
+            </a:r>
+          </a:p>
+        </p:txBody>
+      </p:sp>
+    </p:spTree>
+    <p:extLst>
+      <p:ext uri="{BB962C8B-B14F-4D97-AF65-F5344CB8AC3E}">
+        <p14:creationId xmlns:p14="http://schemas.microsoft.com/office/powerpoint/2010/main" val="2709082398"/>
       </p:ext>
     </p:extLst>
   </p:cSld>

</xml_diff>